<commit_message>
updated to use react router 6 & axios; modified UI
</commit_message>
<xml_diff>
--- a/project proposal.pptx
+++ b/project proposal.pptx
@@ -9,6 +9,10 @@
     <p:sldId id="257" r:id="rId3"/>
     <p:sldId id="258" r:id="rId4"/>
     <p:sldId id="259" r:id="rId5"/>
+    <p:sldId id="261" r:id="rId6"/>
+    <p:sldId id="262" r:id="rId7"/>
+    <p:sldId id="263" r:id="rId8"/>
+    <p:sldId id="264" r:id="rId9"/>
   </p:sldIdLst>
   <p:sldSz cx="12192000" cy="6858000"/>
   <p:notesSz cx="6858000" cy="9144000"/>
@@ -4668,6 +4672,378 @@
 </p:sld>
 </file>
 
+<file path=ppt/slides/slide5.xml><?xml version="1.0" encoding="utf-8"?>
+<p:sld xmlns:a="http://schemas.openxmlformats.org/drawingml/2006/main" xmlns:r="http://schemas.openxmlformats.org/officeDocument/2006/relationships" xmlns:p="http://schemas.openxmlformats.org/presentationml/2006/main">
+  <p:cSld>
+    <p:spTree>
+      <p:nvGrpSpPr>
+        <p:cNvPr id="1" name=""/>
+        <p:cNvGrpSpPr/>
+        <p:nvPr/>
+      </p:nvGrpSpPr>
+      <p:grpSpPr>
+        <a:xfrm>
+          <a:off x="0" y="0"/>
+          <a:ext cx="0" cy="0"/>
+          <a:chOff x="0" y="0"/>
+          <a:chExt cx="0" cy="0"/>
+        </a:xfrm>
+      </p:grpSpPr>
+      <p:pic>
+        <p:nvPicPr>
+          <p:cNvPr id="3" name="Picture 2">
+            <a:extLst>
+              <a:ext uri="{FF2B5EF4-FFF2-40B4-BE49-F238E27FC236}">
+                <a16:creationId xmlns:a16="http://schemas.microsoft.com/office/drawing/2014/main" id="{1293AF5E-EE67-44CE-8F45-ABC039CDB1F1}"/>
+              </a:ext>
+            </a:extLst>
+          </p:cNvPr>
+          <p:cNvPicPr>
+            <a:picLocks noChangeAspect="1"/>
+          </p:cNvPicPr>
+          <p:nvPr/>
+        </p:nvPicPr>
+        <p:blipFill>
+          <a:blip r:embed="rId2"/>
+          <a:stretch>
+            <a:fillRect/>
+          </a:stretch>
+        </p:blipFill>
+        <p:spPr>
+          <a:xfrm>
+            <a:off x="3343133" y="701535"/>
+            <a:ext cx="5505733" cy="5454930"/>
+          </a:xfrm>
+          <a:prstGeom prst="rect">
+            <a:avLst/>
+          </a:prstGeom>
+        </p:spPr>
+      </p:pic>
+    </p:spTree>
+    <p:extLst>
+      <p:ext uri="{BB962C8B-B14F-4D97-AF65-F5344CB8AC3E}">
+        <p14:creationId xmlns:p14="http://schemas.microsoft.com/office/powerpoint/2010/main" val="1834145455"/>
+      </p:ext>
+    </p:extLst>
+  </p:cSld>
+  <p:clrMapOvr>
+    <a:masterClrMapping/>
+  </p:clrMapOvr>
+</p:sld>
+</file>
+
+<file path=ppt/slides/slide6.xml><?xml version="1.0" encoding="utf-8"?>
+<p:sld xmlns:a="http://schemas.openxmlformats.org/drawingml/2006/main" xmlns:r="http://schemas.openxmlformats.org/officeDocument/2006/relationships" xmlns:p="http://schemas.openxmlformats.org/presentationml/2006/main">
+  <p:cSld>
+    <p:spTree>
+      <p:nvGrpSpPr>
+        <p:cNvPr id="1" name=""/>
+        <p:cNvGrpSpPr/>
+        <p:nvPr/>
+      </p:nvGrpSpPr>
+      <p:grpSpPr>
+        <a:xfrm>
+          <a:off x="0" y="0"/>
+          <a:ext cx="0" cy="0"/>
+          <a:chOff x="0" y="0"/>
+          <a:chExt cx="0" cy="0"/>
+        </a:xfrm>
+      </p:grpSpPr>
+      <p:pic>
+        <p:nvPicPr>
+          <p:cNvPr id="3" name="Picture 2">
+            <a:extLst>
+              <a:ext uri="{FF2B5EF4-FFF2-40B4-BE49-F238E27FC236}">
+                <a16:creationId xmlns:a16="http://schemas.microsoft.com/office/drawing/2014/main" id="{0934565C-CD34-4100-9F36-F754846C227E}"/>
+              </a:ext>
+            </a:extLst>
+          </p:cNvPr>
+          <p:cNvPicPr>
+            <a:picLocks noChangeAspect="1"/>
+          </p:cNvPicPr>
+          <p:nvPr/>
+        </p:nvPicPr>
+        <p:blipFill>
+          <a:blip r:embed="rId2"/>
+          <a:stretch>
+            <a:fillRect/>
+          </a:stretch>
+        </p:blipFill>
+        <p:spPr>
+          <a:xfrm>
+            <a:off x="2038141" y="749162"/>
+            <a:ext cx="8115717" cy="5359675"/>
+          </a:xfrm>
+          <a:prstGeom prst="rect">
+            <a:avLst/>
+          </a:prstGeom>
+        </p:spPr>
+      </p:pic>
+    </p:spTree>
+    <p:extLst>
+      <p:ext uri="{BB962C8B-B14F-4D97-AF65-F5344CB8AC3E}">
+        <p14:creationId xmlns:p14="http://schemas.microsoft.com/office/powerpoint/2010/main" val="3554922686"/>
+      </p:ext>
+    </p:extLst>
+  </p:cSld>
+  <p:clrMapOvr>
+    <a:masterClrMapping/>
+  </p:clrMapOvr>
+</p:sld>
+</file>
+
+<file path=ppt/slides/slide7.xml><?xml version="1.0" encoding="utf-8"?>
+<p:sld xmlns:a="http://schemas.openxmlformats.org/drawingml/2006/main" xmlns:r="http://schemas.openxmlformats.org/officeDocument/2006/relationships" xmlns:p="http://schemas.openxmlformats.org/presentationml/2006/main">
+  <p:cSld>
+    <p:spTree>
+      <p:nvGrpSpPr>
+        <p:cNvPr id="1" name=""/>
+        <p:cNvGrpSpPr/>
+        <p:nvPr/>
+      </p:nvGrpSpPr>
+      <p:grpSpPr>
+        <a:xfrm>
+          <a:off x="0" y="0"/>
+          <a:ext cx="0" cy="0"/>
+          <a:chOff x="0" y="0"/>
+          <a:chExt cx="0" cy="0"/>
+        </a:xfrm>
+      </p:grpSpPr>
+      <p:pic>
+        <p:nvPicPr>
+          <p:cNvPr id="3" name="Picture 2">
+            <a:extLst>
+              <a:ext uri="{FF2B5EF4-FFF2-40B4-BE49-F238E27FC236}">
+                <a16:creationId xmlns:a16="http://schemas.microsoft.com/office/drawing/2014/main" id="{AF6C6127-8A92-4124-B9BD-E9D6750B7C13}"/>
+              </a:ext>
+            </a:extLst>
+          </p:cNvPr>
+          <p:cNvPicPr>
+            <a:picLocks noChangeAspect="1"/>
+          </p:cNvPicPr>
+          <p:nvPr/>
+        </p:nvPicPr>
+        <p:blipFill>
+          <a:blip r:embed="rId2"/>
+          <a:stretch>
+            <a:fillRect/>
+          </a:stretch>
+        </p:blipFill>
+        <p:spPr>
+          <a:xfrm>
+            <a:off x="3276455" y="1473099"/>
+            <a:ext cx="5639090" cy="3911801"/>
+          </a:xfrm>
+          <a:prstGeom prst="rect">
+            <a:avLst/>
+          </a:prstGeom>
+        </p:spPr>
+      </p:pic>
+    </p:spTree>
+    <p:extLst>
+      <p:ext uri="{BB962C8B-B14F-4D97-AF65-F5344CB8AC3E}">
+        <p14:creationId xmlns:p14="http://schemas.microsoft.com/office/powerpoint/2010/main" val="3597189293"/>
+      </p:ext>
+    </p:extLst>
+  </p:cSld>
+  <p:clrMapOvr>
+    <a:masterClrMapping/>
+  </p:clrMapOvr>
+</p:sld>
+</file>
+
+<file path=ppt/slides/slide8.xml><?xml version="1.0" encoding="utf-8"?>
+<p:sld xmlns:a="http://schemas.openxmlformats.org/drawingml/2006/main" xmlns:r="http://schemas.openxmlformats.org/officeDocument/2006/relationships" xmlns:p="http://schemas.openxmlformats.org/presentationml/2006/main">
+  <p:cSld>
+    <p:spTree>
+      <p:nvGrpSpPr>
+        <p:cNvPr id="1" name=""/>
+        <p:cNvGrpSpPr/>
+        <p:nvPr/>
+      </p:nvGrpSpPr>
+      <p:grpSpPr>
+        <a:xfrm>
+          <a:off x="0" y="0"/>
+          <a:ext cx="0" cy="0"/>
+          <a:chOff x="0" y="0"/>
+          <a:chExt cx="0" cy="0"/>
+        </a:xfrm>
+      </p:grpSpPr>
+      <p:sp>
+        <p:nvSpPr>
+          <p:cNvPr id="2" name="TextBox 1">
+            <a:extLst>
+              <a:ext uri="{FF2B5EF4-FFF2-40B4-BE49-F238E27FC236}">
+                <a16:creationId xmlns:a16="http://schemas.microsoft.com/office/drawing/2014/main" id="{8193C898-F00B-4B11-9D13-1E31B56126F6}"/>
+              </a:ext>
+            </a:extLst>
+          </p:cNvPr>
+          <p:cNvSpPr txBox="1"/>
+          <p:nvPr/>
+        </p:nvSpPr>
+        <p:spPr>
+          <a:xfrm flipH="1">
+            <a:off x="4262119" y="2387600"/>
+            <a:ext cx="5886029" cy="1477328"/>
+          </a:xfrm>
+          <a:prstGeom prst="rect">
+            <a:avLst/>
+          </a:prstGeom>
+          <a:noFill/>
+        </p:spPr>
+        <p:txBody>
+          <a:bodyPr wrap="square" rtlCol="0">
+            <a:spAutoFit/>
+          </a:bodyPr>
+          <a:lstStyle/>
+          <a:p>
+            <a:r>
+              <a:rPr lang="en-SG" dirty="0"/>
+              <a:t>atomic habits "</a:t>
+            </a:r>
+            <a:r>
+              <a:rPr lang="en-SG" dirty="0" err="1"/>
+              <a:t>james</a:t>
+            </a:r>
+            <a:r>
+              <a:rPr lang="en-SG" dirty="0"/>
+              <a:t> clear“</a:t>
+            </a:r>
+          </a:p>
+          <a:p>
+            <a:r>
+              <a:rPr lang="en-SG" dirty="0"/>
+              <a:t>Happiness project Gretchen</a:t>
+            </a:r>
+          </a:p>
+          <a:p>
+            <a:r>
+              <a:rPr lang="en-SG" dirty="0"/>
+              <a:t>See when you slow down haemin</a:t>
+            </a:r>
+          </a:p>
+          <a:p>
+            <a:r>
+              <a:rPr lang="en-SG" dirty="0"/>
+              <a:t>Midnight library matt </a:t>
+            </a:r>
+            <a:r>
+              <a:rPr lang="en-SG" dirty="0" err="1"/>
+              <a:t>haig</a:t>
+            </a:r>
+            <a:endParaRPr lang="en-SG" dirty="0"/>
+          </a:p>
+          <a:p>
+            <a:r>
+              <a:rPr lang="en-SG" dirty="0"/>
+              <a:t>Breathe becomes air </a:t>
+            </a:r>
+            <a:r>
+              <a:rPr lang="en-SG" b="0" i="1" dirty="0">
+                <a:solidFill>
+                  <a:srgbClr val="212529"/>
+                </a:solidFill>
+                <a:effectLst/>
+                <a:latin typeface="system-ui"/>
+              </a:rPr>
+              <a:t>Paul Kalanithi</a:t>
+            </a:r>
+            <a:endParaRPr lang="en-SG" dirty="0"/>
+          </a:p>
+        </p:txBody>
+      </p:sp>
+      <p:sp>
+        <p:nvSpPr>
+          <p:cNvPr id="3" name="TextBox 2">
+            <a:extLst>
+              <a:ext uri="{FF2B5EF4-FFF2-40B4-BE49-F238E27FC236}">
+                <a16:creationId xmlns:a16="http://schemas.microsoft.com/office/drawing/2014/main" id="{1CB80447-747E-4CF9-89CE-7975A43C3425}"/>
+              </a:ext>
+            </a:extLst>
+          </p:cNvPr>
+          <p:cNvSpPr txBox="1"/>
+          <p:nvPr/>
+        </p:nvSpPr>
+        <p:spPr>
+          <a:xfrm>
+            <a:off x="4262119" y="4318000"/>
+            <a:ext cx="6998548" cy="1477328"/>
+          </a:xfrm>
+          <a:prstGeom prst="rect">
+            <a:avLst/>
+          </a:prstGeom>
+          <a:noFill/>
+        </p:spPr>
+        <p:txBody>
+          <a:bodyPr wrap="square" rtlCol="0">
+            <a:spAutoFit/>
+          </a:bodyPr>
+          <a:lstStyle/>
+          <a:p>
+            <a:pPr marL="285750" indent="-285750">
+              <a:buFontTx/>
+              <a:buChar char="-"/>
+            </a:pPr>
+            <a:r>
+              <a:rPr lang="en-SG"/>
+              <a:t>2 API</a:t>
+            </a:r>
+          </a:p>
+          <a:p>
+            <a:pPr marL="285750" indent="-285750">
+              <a:buFontTx/>
+              <a:buChar char="-"/>
+            </a:pPr>
+            <a:r>
+              <a:rPr lang="en-SG" dirty="0"/>
+              <a:t>Image</a:t>
+            </a:r>
+          </a:p>
+          <a:p>
+            <a:pPr marL="285750" indent="-285750">
+              <a:buFontTx/>
+              <a:buChar char="-"/>
+            </a:pPr>
+            <a:r>
+              <a:rPr lang="en-SG" dirty="0"/>
+              <a:t>Date</a:t>
+            </a:r>
+          </a:p>
+          <a:p>
+            <a:pPr marL="285750" indent="-285750">
+              <a:buFontTx/>
+              <a:buChar char="-"/>
+            </a:pPr>
+            <a:r>
+              <a:rPr lang="en-SG" dirty="0"/>
+              <a:t>Bootstrap</a:t>
+            </a:r>
+          </a:p>
+          <a:p>
+            <a:pPr marL="285750" indent="-285750">
+              <a:buFontTx/>
+              <a:buChar char="-"/>
+            </a:pPr>
+            <a:r>
+              <a:rPr lang="en-SG" dirty="0"/>
+              <a:t>sort</a:t>
+            </a:r>
+          </a:p>
+        </p:txBody>
+      </p:sp>
+    </p:spTree>
+    <p:extLst>
+      <p:ext uri="{BB962C8B-B14F-4D97-AF65-F5344CB8AC3E}">
+        <p14:creationId xmlns:p14="http://schemas.microsoft.com/office/powerpoint/2010/main" val="3350365505"/>
+      </p:ext>
+    </p:extLst>
+  </p:cSld>
+  <p:clrMapOvr>
+    <a:masterClrMapping/>
+  </p:clrMapOvr>
+</p:sld>
+</file>
+
 <file path=ppt/theme/theme1.xml><?xml version="1.0" encoding="utf-8"?>
 <a:theme xmlns:a="http://schemas.openxmlformats.org/drawingml/2006/main" name="Office Theme">
   <a:themeElements>

</xml_diff>